<commit_message>
rename "graphical engine" in "graphics engine"
</commit_message>
<xml_diff>
--- a/ApplicationDeveloperGuide/UI/images/ui_overview.pptx
+++ b/ApplicationDeveloperGuide/UI/images/ui_overview.pptx
@@ -239,7 +239,7 @@
               <a:rPr lang="fr-FR" smtClean="0">
                 <a:latin typeface="Calibri Regular" charset="0"/>
               </a:rPr>
-              <a:t>janvier 21</a:t>
+              <a:t>janvier 23</a:t>
             </a:fld>
             <a:endParaRPr lang="en-US" dirty="0">
               <a:latin typeface="Calibri Regular" charset="0"/>
@@ -418,7 +418,7 @@
             <a:fld id="{79958FA1-9FE8-F149-AB4B-7DC9950B39E9}" type="datetime6">
               <a:rPr lang="fr-FR" smtClean="0"/>
               <a:pPr/>
-              <a:t>janvier 21</a:t>
+              <a:t>janvier 23</a:t>
             </a:fld>
             <a:endParaRPr lang="en-US" dirty="0"/>
           </a:p>
@@ -10133,7 +10133,7 @@
                 <a:ea typeface="Source Sans Pro Light" charset="0"/>
                 <a:cs typeface="Source Sans Pro Light" charset="0"/>
               </a:rPr>
-              <a:t>Graphical Engine</a:t>
+              <a:t>Graphics Engine</a:t>
             </a:r>
           </a:p>
         </p:txBody>

</xml_diff>

<commit_message>
Add "MicroVG" and "GPU" to the GUI overview schema
</commit_message>
<xml_diff>
--- a/ApplicationDeveloperGuide/UI/images/ui_overview.pptx
+++ b/ApplicationDeveloperGuide/UI/images/ui_overview.pptx
@@ -239,7 +239,7 @@
               <a:rPr lang="fr-FR" smtClean="0">
                 <a:latin typeface="Calibri Regular" charset="0"/>
               </a:rPr>
-              <a:t>janvier 23</a:t>
+              <a:t>octobre 23</a:t>
             </a:fld>
             <a:endParaRPr lang="en-US" dirty="0">
               <a:latin typeface="Calibri Regular" charset="0"/>
@@ -418,7 +418,7 @@
             <a:fld id="{79958FA1-9FE8-F149-AB4B-7DC9950B39E9}" type="datetime6">
               <a:rPr lang="fr-FR" smtClean="0"/>
               <a:pPr/>
-              <a:t>janvier 23</a:t>
+              <a:t>octobre 23</a:t>
             </a:fld>
             <a:endParaRPr lang="en-US" dirty="0"/>
           </a:p>
@@ -10654,7 +10654,7 @@
           <a:p>
             <a:pPr algn="ctr"/>
             <a:r>
-              <a:rPr lang="en-US" sz="1200" dirty="0">
+              <a:rPr lang="en-US" sz="1200" dirty="0" err="1">
                 <a:solidFill>
                   <a:schemeClr val="accent1"/>
                 </a:solidFill>
@@ -10662,8 +10662,16 @@
                 <a:ea typeface="Source Sans Pro Light" charset="0"/>
                 <a:cs typeface="Source Sans Pro Light" charset="0"/>
               </a:rPr>
-              <a:t>Drawing</a:t>
-            </a:r>
+              <a:t>MicroVG</a:t>
+            </a:r>
+            <a:endParaRPr lang="en-US" sz="1200" dirty="0">
+              <a:solidFill>
+                <a:schemeClr val="accent1"/>
+              </a:solidFill>
+              <a:latin typeface="Source Sans Pro Light" charset="0"/>
+              <a:ea typeface="Source Sans Pro Light" charset="0"/>
+              <a:cs typeface="Source Sans Pro Light" charset="0"/>
+            </a:endParaRPr>
           </a:p>
         </p:txBody>
       </p:sp>
@@ -10796,7 +10804,7 @@
                 </a:solidFill>
                 <a:latin typeface="Source Sans Pro Light" charset="0"/>
               </a:rPr>
-              <a:t>Touch</a:t>
+              <a:t>Input devices</a:t>
             </a:r>
           </a:p>
         </p:txBody>
@@ -10863,7 +10871,7 @@
                 </a:solidFill>
                 <a:latin typeface="Source Sans Pro Light" charset="0"/>
               </a:rPr>
-              <a:t>Buttons</a:t>
+              <a:t>GPU</a:t>
             </a:r>
           </a:p>
         </p:txBody>

</xml_diff>